<commit_message>
Edited the outline of the presentation.
</commit_message>
<xml_diff>
--- a/presentation/oct 17 discussion notes.pptx
+++ b/presentation/oct 17 discussion notes.pptx
@@ -1,6 +1,6 @@
 
 <file path=ppt/presentation.xml><?xml version="1.0" encoding="utf-8"?>
-<p:presentation xmlns:a="http://schemas.openxmlformats.org/drawingml/2006/main" xmlns:r="http://schemas.openxmlformats.org/officeDocument/2006/relationships" xmlns:p="http://schemas.openxmlformats.org/presentationml/2006/main" saveSubsetFonts="1">
+<p:presentation xmlns:a="http://schemas.openxmlformats.org/drawingml/2006/main" xmlns:r="http://schemas.openxmlformats.org/officeDocument/2006/relationships" xmlns:mc="http://schemas.openxmlformats.org/markup-compatibility/2006" xmlns:mv="urn:schemas-microsoft-com:mac:vml" xmlns:p="http://schemas.openxmlformats.org/presentationml/2006/main" mc:Ignorable="mv" mc:PreserveAttributes="mv:*" saveSubsetFonts="1">
   <p:sldMasterIdLst>
     <p:sldMasterId id="2147483648" r:id="rId1"/>
   </p:sldMasterIdLst>
@@ -10,7 +10,7 @@
   <p:sldSz cx="9144000" cy="6858000" type="screen4x3"/>
   <p:notesSz cx="6858000" cy="9144000"/>
   <p:custDataLst>
-    <p:tags r:id="rId3"/>
+    <p:tags r:id="rId4"/>
   </p:custDataLst>
   <p:defaultTextStyle>
     <a:defPPr>
@@ -111,7 +111,7 @@
 </file>
 
 <file path=ppt/slideLayouts/slideLayout1.xml><?xml version="1.0" encoding="utf-8"?>
-<p:sldLayout xmlns:a="http://schemas.openxmlformats.org/drawingml/2006/main" xmlns:r="http://schemas.openxmlformats.org/officeDocument/2006/relationships" xmlns:p="http://schemas.openxmlformats.org/presentationml/2006/main" type="title" preserve="1">
+<p:sldLayout xmlns:a="http://schemas.openxmlformats.org/drawingml/2006/main" xmlns:r="http://schemas.openxmlformats.org/officeDocument/2006/relationships" xmlns:mc="http://schemas.openxmlformats.org/markup-compatibility/2006" xmlns:mv="urn:schemas-microsoft-com:mac:vml" xmlns:p="http://schemas.openxmlformats.org/presentationml/2006/main" mc:Ignorable="mv" mc:PreserveAttributes="mv:*" type="title" preserve="1">
   <p:cSld name="Title Slide">
     <p:spTree>
       <p:nvGrpSpPr>
@@ -291,7 +291,8 @@
           <a:p>
             <a:fld id="{061D1A9E-CEF3-4B83-AED0-22B57E03EB86}" type="datetimeFigureOut">
               <a:rPr lang="en-US" smtClean="0"/>
-              <a:t>10/17/2012</a:t>
+              <a:pPr/>
+              <a:t>10/17/12</a:t>
             </a:fld>
             <a:endParaRPr lang="en-US"/>
           </a:p>
@@ -333,6 +334,7 @@
           <a:p>
             <a:fld id="{871DFA71-C2DA-48F3-BBF9-C56BDFDCA947}" type="slidenum">
               <a:rPr lang="en-US" smtClean="0"/>
+              <a:pPr/>
               <a:t>‹#›</a:t>
             </a:fld>
             <a:endParaRPr lang="en-US"/>
@@ -342,7 +344,7 @@
     </p:spTree>
     <p:extLst>
       <p:ext uri="{BB962C8B-B14F-4D97-AF65-F5344CB8AC3E}">
-        <p14:creationId xmlns:p14="http://schemas.microsoft.com/office/powerpoint/2010/main" val="332829595"/>
+        <p14:creationId xmlns:p14="http://schemas.microsoft.com/office/powerpoint/2010/main" xmlns:p="http://schemas.openxmlformats.org/presentationml/2006/main" xmlns:r="http://schemas.openxmlformats.org/officeDocument/2006/relationships" xmlns:a="http://schemas.openxmlformats.org/drawingml/2006/main" xmlns="" val="332829595"/>
       </p:ext>
     </p:extLst>
   </p:cSld>
@@ -353,7 +355,7 @@
 </file>
 
 <file path=ppt/slideLayouts/slideLayout10.xml><?xml version="1.0" encoding="utf-8"?>
-<p:sldLayout xmlns:a="http://schemas.openxmlformats.org/drawingml/2006/main" xmlns:r="http://schemas.openxmlformats.org/officeDocument/2006/relationships" xmlns:p="http://schemas.openxmlformats.org/presentationml/2006/main" type="vertTx" preserve="1">
+<p:sldLayout xmlns:a="http://schemas.openxmlformats.org/drawingml/2006/main" xmlns:r="http://schemas.openxmlformats.org/officeDocument/2006/relationships" xmlns:mc="http://schemas.openxmlformats.org/markup-compatibility/2006" xmlns:mv="urn:schemas-microsoft-com:mac:vml" xmlns:p="http://schemas.openxmlformats.org/presentationml/2006/main" mc:Ignorable="mv" mc:PreserveAttributes="mv:*" type="vertTx" preserve="1">
   <p:cSld name="Title and Vertical Text">
     <p:spTree>
       <p:nvGrpSpPr>
@@ -461,7 +463,8 @@
           <a:p>
             <a:fld id="{061D1A9E-CEF3-4B83-AED0-22B57E03EB86}" type="datetimeFigureOut">
               <a:rPr lang="en-US" smtClean="0"/>
-              <a:t>10/17/2012</a:t>
+              <a:pPr/>
+              <a:t>10/17/12</a:t>
             </a:fld>
             <a:endParaRPr lang="en-US"/>
           </a:p>
@@ -503,6 +506,7 @@
           <a:p>
             <a:fld id="{871DFA71-C2DA-48F3-BBF9-C56BDFDCA947}" type="slidenum">
               <a:rPr lang="en-US" smtClean="0"/>
+              <a:pPr/>
               <a:t>‹#›</a:t>
             </a:fld>
             <a:endParaRPr lang="en-US"/>
@@ -512,7 +516,7 @@
     </p:spTree>
     <p:extLst>
       <p:ext uri="{BB962C8B-B14F-4D97-AF65-F5344CB8AC3E}">
-        <p14:creationId xmlns:p14="http://schemas.microsoft.com/office/powerpoint/2010/main" val="1881662088"/>
+        <p14:creationId xmlns:p14="http://schemas.microsoft.com/office/powerpoint/2010/main" xmlns:p="http://schemas.openxmlformats.org/presentationml/2006/main" xmlns:r="http://schemas.openxmlformats.org/officeDocument/2006/relationships" xmlns:a="http://schemas.openxmlformats.org/drawingml/2006/main" xmlns="" val="1881662088"/>
       </p:ext>
     </p:extLst>
   </p:cSld>
@@ -523,7 +527,7 @@
 </file>
 
 <file path=ppt/slideLayouts/slideLayout11.xml><?xml version="1.0" encoding="utf-8"?>
-<p:sldLayout xmlns:a="http://schemas.openxmlformats.org/drawingml/2006/main" xmlns:r="http://schemas.openxmlformats.org/officeDocument/2006/relationships" xmlns:p="http://schemas.openxmlformats.org/presentationml/2006/main" type="vertTitleAndTx" preserve="1">
+<p:sldLayout xmlns:a="http://schemas.openxmlformats.org/drawingml/2006/main" xmlns:r="http://schemas.openxmlformats.org/officeDocument/2006/relationships" xmlns:mc="http://schemas.openxmlformats.org/markup-compatibility/2006" xmlns:mv="urn:schemas-microsoft-com:mac:vml" xmlns:p="http://schemas.openxmlformats.org/presentationml/2006/main" mc:Ignorable="mv" mc:PreserveAttributes="mv:*" type="vertTitleAndTx" preserve="1">
   <p:cSld name="Vertical Title and Text">
     <p:spTree>
       <p:nvGrpSpPr>
@@ -641,7 +645,8 @@
           <a:p>
             <a:fld id="{061D1A9E-CEF3-4B83-AED0-22B57E03EB86}" type="datetimeFigureOut">
               <a:rPr lang="en-US" smtClean="0"/>
-              <a:t>10/17/2012</a:t>
+              <a:pPr/>
+              <a:t>10/17/12</a:t>
             </a:fld>
             <a:endParaRPr lang="en-US"/>
           </a:p>
@@ -683,6 +688,7 @@
           <a:p>
             <a:fld id="{871DFA71-C2DA-48F3-BBF9-C56BDFDCA947}" type="slidenum">
               <a:rPr lang="en-US" smtClean="0"/>
+              <a:pPr/>
               <a:t>‹#›</a:t>
             </a:fld>
             <a:endParaRPr lang="en-US"/>
@@ -692,7 +698,7 @@
     </p:spTree>
     <p:extLst>
       <p:ext uri="{BB962C8B-B14F-4D97-AF65-F5344CB8AC3E}">
-        <p14:creationId xmlns:p14="http://schemas.microsoft.com/office/powerpoint/2010/main" val="3018918736"/>
+        <p14:creationId xmlns:p14="http://schemas.microsoft.com/office/powerpoint/2010/main" xmlns:p="http://schemas.openxmlformats.org/presentationml/2006/main" xmlns:r="http://schemas.openxmlformats.org/officeDocument/2006/relationships" xmlns:a="http://schemas.openxmlformats.org/drawingml/2006/main" xmlns="" val="3018918736"/>
       </p:ext>
     </p:extLst>
   </p:cSld>
@@ -703,7 +709,7 @@
 </file>
 
 <file path=ppt/slideLayouts/slideLayout2.xml><?xml version="1.0" encoding="utf-8"?>
-<p:sldLayout xmlns:a="http://schemas.openxmlformats.org/drawingml/2006/main" xmlns:r="http://schemas.openxmlformats.org/officeDocument/2006/relationships" xmlns:p="http://schemas.openxmlformats.org/presentationml/2006/main" type="obj" preserve="1">
+<p:sldLayout xmlns:a="http://schemas.openxmlformats.org/drawingml/2006/main" xmlns:r="http://schemas.openxmlformats.org/officeDocument/2006/relationships" xmlns:mc="http://schemas.openxmlformats.org/markup-compatibility/2006" xmlns:mv="urn:schemas-microsoft-com:mac:vml" xmlns:p="http://schemas.openxmlformats.org/presentationml/2006/main" mc:Ignorable="mv" mc:PreserveAttributes="mv:*" type="obj" preserve="1">
   <p:cSld name="Title and Content">
     <p:spTree>
       <p:nvGrpSpPr>
@@ -811,7 +817,8 @@
           <a:p>
             <a:fld id="{061D1A9E-CEF3-4B83-AED0-22B57E03EB86}" type="datetimeFigureOut">
               <a:rPr lang="en-US" smtClean="0"/>
-              <a:t>10/17/2012</a:t>
+              <a:pPr/>
+              <a:t>10/17/12</a:t>
             </a:fld>
             <a:endParaRPr lang="en-US"/>
           </a:p>
@@ -853,6 +860,7 @@
           <a:p>
             <a:fld id="{871DFA71-C2DA-48F3-BBF9-C56BDFDCA947}" type="slidenum">
               <a:rPr lang="en-US" smtClean="0"/>
+              <a:pPr/>
               <a:t>‹#›</a:t>
             </a:fld>
             <a:endParaRPr lang="en-US"/>
@@ -862,7 +870,7 @@
     </p:spTree>
     <p:extLst>
       <p:ext uri="{BB962C8B-B14F-4D97-AF65-F5344CB8AC3E}">
-        <p14:creationId xmlns:p14="http://schemas.microsoft.com/office/powerpoint/2010/main" val="842346054"/>
+        <p14:creationId xmlns:p14="http://schemas.microsoft.com/office/powerpoint/2010/main" xmlns:p="http://schemas.openxmlformats.org/presentationml/2006/main" xmlns:r="http://schemas.openxmlformats.org/officeDocument/2006/relationships" xmlns:a="http://schemas.openxmlformats.org/drawingml/2006/main" xmlns="" val="842346054"/>
       </p:ext>
     </p:extLst>
   </p:cSld>
@@ -873,7 +881,7 @@
 </file>
 
 <file path=ppt/slideLayouts/slideLayout3.xml><?xml version="1.0" encoding="utf-8"?>
-<p:sldLayout xmlns:a="http://schemas.openxmlformats.org/drawingml/2006/main" xmlns:r="http://schemas.openxmlformats.org/officeDocument/2006/relationships" xmlns:p="http://schemas.openxmlformats.org/presentationml/2006/main" type="secHead" preserve="1">
+<p:sldLayout xmlns:a="http://schemas.openxmlformats.org/drawingml/2006/main" xmlns:r="http://schemas.openxmlformats.org/officeDocument/2006/relationships" xmlns:mc="http://schemas.openxmlformats.org/markup-compatibility/2006" xmlns:mv="urn:schemas-microsoft-com:mac:vml" xmlns:p="http://schemas.openxmlformats.org/presentationml/2006/main" mc:Ignorable="mv" mc:PreserveAttributes="mv:*" type="secHead" preserve="1">
   <p:cSld name="Section Header">
     <p:spTree>
       <p:nvGrpSpPr>
@@ -1057,7 +1065,8 @@
           <a:p>
             <a:fld id="{061D1A9E-CEF3-4B83-AED0-22B57E03EB86}" type="datetimeFigureOut">
               <a:rPr lang="en-US" smtClean="0"/>
-              <a:t>10/17/2012</a:t>
+              <a:pPr/>
+              <a:t>10/17/12</a:t>
             </a:fld>
             <a:endParaRPr lang="en-US"/>
           </a:p>
@@ -1099,6 +1108,7 @@
           <a:p>
             <a:fld id="{871DFA71-C2DA-48F3-BBF9-C56BDFDCA947}" type="slidenum">
               <a:rPr lang="en-US" smtClean="0"/>
+              <a:pPr/>
               <a:t>‹#›</a:t>
             </a:fld>
             <a:endParaRPr lang="en-US"/>
@@ -1108,7 +1118,7 @@
     </p:spTree>
     <p:extLst>
       <p:ext uri="{BB962C8B-B14F-4D97-AF65-F5344CB8AC3E}">
-        <p14:creationId xmlns:p14="http://schemas.microsoft.com/office/powerpoint/2010/main" val="3336461329"/>
+        <p14:creationId xmlns:p14="http://schemas.microsoft.com/office/powerpoint/2010/main" xmlns:p="http://schemas.openxmlformats.org/presentationml/2006/main" xmlns:r="http://schemas.openxmlformats.org/officeDocument/2006/relationships" xmlns:a="http://schemas.openxmlformats.org/drawingml/2006/main" xmlns="" val="3336461329"/>
       </p:ext>
     </p:extLst>
   </p:cSld>
@@ -1119,7 +1129,7 @@
 </file>
 
 <file path=ppt/slideLayouts/slideLayout4.xml><?xml version="1.0" encoding="utf-8"?>
-<p:sldLayout xmlns:a="http://schemas.openxmlformats.org/drawingml/2006/main" xmlns:r="http://schemas.openxmlformats.org/officeDocument/2006/relationships" xmlns:p="http://schemas.openxmlformats.org/presentationml/2006/main" type="twoObj" preserve="1">
+<p:sldLayout xmlns:a="http://schemas.openxmlformats.org/drawingml/2006/main" xmlns:r="http://schemas.openxmlformats.org/officeDocument/2006/relationships" xmlns:mc="http://schemas.openxmlformats.org/markup-compatibility/2006" xmlns:mv="urn:schemas-microsoft-com:mac:vml" xmlns:p="http://schemas.openxmlformats.org/presentationml/2006/main" mc:Ignorable="mv" mc:PreserveAttributes="mv:*" type="twoObj" preserve="1">
   <p:cSld name="Two Content">
     <p:spTree>
       <p:nvGrpSpPr>
@@ -1345,7 +1355,8 @@
           <a:p>
             <a:fld id="{061D1A9E-CEF3-4B83-AED0-22B57E03EB86}" type="datetimeFigureOut">
               <a:rPr lang="en-US" smtClean="0"/>
-              <a:t>10/17/2012</a:t>
+              <a:pPr/>
+              <a:t>10/17/12</a:t>
             </a:fld>
             <a:endParaRPr lang="en-US"/>
           </a:p>
@@ -1387,6 +1398,7 @@
           <a:p>
             <a:fld id="{871DFA71-C2DA-48F3-BBF9-C56BDFDCA947}" type="slidenum">
               <a:rPr lang="en-US" smtClean="0"/>
+              <a:pPr/>
               <a:t>‹#›</a:t>
             </a:fld>
             <a:endParaRPr lang="en-US"/>
@@ -1396,7 +1408,7 @@
     </p:spTree>
     <p:extLst>
       <p:ext uri="{BB962C8B-B14F-4D97-AF65-F5344CB8AC3E}">
-        <p14:creationId xmlns:p14="http://schemas.microsoft.com/office/powerpoint/2010/main" val="3257052603"/>
+        <p14:creationId xmlns:p14="http://schemas.microsoft.com/office/powerpoint/2010/main" xmlns:p="http://schemas.openxmlformats.org/presentationml/2006/main" xmlns:r="http://schemas.openxmlformats.org/officeDocument/2006/relationships" xmlns:a="http://schemas.openxmlformats.org/drawingml/2006/main" xmlns="" val="3257052603"/>
       </p:ext>
     </p:extLst>
   </p:cSld>
@@ -1407,7 +1419,7 @@
 </file>
 
 <file path=ppt/slideLayouts/slideLayout5.xml><?xml version="1.0" encoding="utf-8"?>
-<p:sldLayout xmlns:a="http://schemas.openxmlformats.org/drawingml/2006/main" xmlns:r="http://schemas.openxmlformats.org/officeDocument/2006/relationships" xmlns:p="http://schemas.openxmlformats.org/presentationml/2006/main" type="twoTxTwoObj" preserve="1">
+<p:sldLayout xmlns:a="http://schemas.openxmlformats.org/drawingml/2006/main" xmlns:r="http://schemas.openxmlformats.org/officeDocument/2006/relationships" xmlns:mc="http://schemas.openxmlformats.org/markup-compatibility/2006" xmlns:mv="urn:schemas-microsoft-com:mac:vml" xmlns:p="http://schemas.openxmlformats.org/presentationml/2006/main" mc:Ignorable="mv" mc:PreserveAttributes="mv:*" type="twoTxTwoObj" preserve="1">
   <p:cSld name="Comparison">
     <p:spTree>
       <p:nvGrpSpPr>
@@ -1767,7 +1779,8 @@
           <a:p>
             <a:fld id="{061D1A9E-CEF3-4B83-AED0-22B57E03EB86}" type="datetimeFigureOut">
               <a:rPr lang="en-US" smtClean="0"/>
-              <a:t>10/17/2012</a:t>
+              <a:pPr/>
+              <a:t>10/17/12</a:t>
             </a:fld>
             <a:endParaRPr lang="en-US"/>
           </a:p>
@@ -1809,6 +1822,7 @@
           <a:p>
             <a:fld id="{871DFA71-C2DA-48F3-BBF9-C56BDFDCA947}" type="slidenum">
               <a:rPr lang="en-US" smtClean="0"/>
+              <a:pPr/>
               <a:t>‹#›</a:t>
             </a:fld>
             <a:endParaRPr lang="en-US"/>
@@ -1818,7 +1832,7 @@
     </p:spTree>
     <p:extLst>
       <p:ext uri="{BB962C8B-B14F-4D97-AF65-F5344CB8AC3E}">
-        <p14:creationId xmlns:p14="http://schemas.microsoft.com/office/powerpoint/2010/main" val="3525336737"/>
+        <p14:creationId xmlns:p14="http://schemas.microsoft.com/office/powerpoint/2010/main" xmlns:p="http://schemas.openxmlformats.org/presentationml/2006/main" xmlns:r="http://schemas.openxmlformats.org/officeDocument/2006/relationships" xmlns:a="http://schemas.openxmlformats.org/drawingml/2006/main" xmlns="" val="3525336737"/>
       </p:ext>
     </p:extLst>
   </p:cSld>
@@ -1829,7 +1843,7 @@
 </file>
 
 <file path=ppt/slideLayouts/slideLayout6.xml><?xml version="1.0" encoding="utf-8"?>
-<p:sldLayout xmlns:a="http://schemas.openxmlformats.org/drawingml/2006/main" xmlns:r="http://schemas.openxmlformats.org/officeDocument/2006/relationships" xmlns:p="http://schemas.openxmlformats.org/presentationml/2006/main" type="titleOnly" preserve="1">
+<p:sldLayout xmlns:a="http://schemas.openxmlformats.org/drawingml/2006/main" xmlns:r="http://schemas.openxmlformats.org/officeDocument/2006/relationships" xmlns:mc="http://schemas.openxmlformats.org/markup-compatibility/2006" xmlns:mv="urn:schemas-microsoft-com:mac:vml" xmlns:p="http://schemas.openxmlformats.org/presentationml/2006/main" mc:Ignorable="mv" mc:PreserveAttributes="mv:*" type="titleOnly" preserve="1">
   <p:cSld name="Title Only">
     <p:spTree>
       <p:nvGrpSpPr>
@@ -1885,7 +1899,8 @@
           <a:p>
             <a:fld id="{061D1A9E-CEF3-4B83-AED0-22B57E03EB86}" type="datetimeFigureOut">
               <a:rPr lang="en-US" smtClean="0"/>
-              <a:t>10/17/2012</a:t>
+              <a:pPr/>
+              <a:t>10/17/12</a:t>
             </a:fld>
             <a:endParaRPr lang="en-US"/>
           </a:p>
@@ -1927,6 +1942,7 @@
           <a:p>
             <a:fld id="{871DFA71-C2DA-48F3-BBF9-C56BDFDCA947}" type="slidenum">
               <a:rPr lang="en-US" smtClean="0"/>
+              <a:pPr/>
               <a:t>‹#›</a:t>
             </a:fld>
             <a:endParaRPr lang="en-US"/>
@@ -1936,7 +1952,7 @@
     </p:spTree>
     <p:extLst>
       <p:ext uri="{BB962C8B-B14F-4D97-AF65-F5344CB8AC3E}">
-        <p14:creationId xmlns:p14="http://schemas.microsoft.com/office/powerpoint/2010/main" val="833575366"/>
+        <p14:creationId xmlns:p14="http://schemas.microsoft.com/office/powerpoint/2010/main" xmlns:p="http://schemas.openxmlformats.org/presentationml/2006/main" xmlns:r="http://schemas.openxmlformats.org/officeDocument/2006/relationships" xmlns:a="http://schemas.openxmlformats.org/drawingml/2006/main" xmlns="" val="833575366"/>
       </p:ext>
     </p:extLst>
   </p:cSld>
@@ -1947,7 +1963,7 @@
 </file>
 
 <file path=ppt/slideLayouts/slideLayout7.xml><?xml version="1.0" encoding="utf-8"?>
-<p:sldLayout xmlns:a="http://schemas.openxmlformats.org/drawingml/2006/main" xmlns:r="http://schemas.openxmlformats.org/officeDocument/2006/relationships" xmlns:p="http://schemas.openxmlformats.org/presentationml/2006/main" type="blank" preserve="1">
+<p:sldLayout xmlns:a="http://schemas.openxmlformats.org/drawingml/2006/main" xmlns:r="http://schemas.openxmlformats.org/officeDocument/2006/relationships" xmlns:mc="http://schemas.openxmlformats.org/markup-compatibility/2006" xmlns:mv="urn:schemas-microsoft-com:mac:vml" xmlns:p="http://schemas.openxmlformats.org/presentationml/2006/main" mc:Ignorable="mv" mc:PreserveAttributes="mv:*" type="blank" preserve="1">
   <p:cSld name="Blank">
     <p:spTree>
       <p:nvGrpSpPr>
@@ -1980,7 +1996,8 @@
           <a:p>
             <a:fld id="{061D1A9E-CEF3-4B83-AED0-22B57E03EB86}" type="datetimeFigureOut">
               <a:rPr lang="en-US" smtClean="0"/>
-              <a:t>10/17/2012</a:t>
+              <a:pPr/>
+              <a:t>10/17/12</a:t>
             </a:fld>
             <a:endParaRPr lang="en-US"/>
           </a:p>
@@ -2022,6 +2039,7 @@
           <a:p>
             <a:fld id="{871DFA71-C2DA-48F3-BBF9-C56BDFDCA947}" type="slidenum">
               <a:rPr lang="en-US" smtClean="0"/>
+              <a:pPr/>
               <a:t>‹#›</a:t>
             </a:fld>
             <a:endParaRPr lang="en-US"/>
@@ -2031,7 +2049,7 @@
     </p:spTree>
     <p:extLst>
       <p:ext uri="{BB962C8B-B14F-4D97-AF65-F5344CB8AC3E}">
-        <p14:creationId xmlns:p14="http://schemas.microsoft.com/office/powerpoint/2010/main" val="2580369890"/>
+        <p14:creationId xmlns:p14="http://schemas.microsoft.com/office/powerpoint/2010/main" xmlns:p="http://schemas.openxmlformats.org/presentationml/2006/main" xmlns:r="http://schemas.openxmlformats.org/officeDocument/2006/relationships" xmlns:a="http://schemas.openxmlformats.org/drawingml/2006/main" xmlns="" val="2580369890"/>
       </p:ext>
     </p:extLst>
   </p:cSld>
@@ -2042,7 +2060,7 @@
 </file>
 
 <file path=ppt/slideLayouts/slideLayout8.xml><?xml version="1.0" encoding="utf-8"?>
-<p:sldLayout xmlns:a="http://schemas.openxmlformats.org/drawingml/2006/main" xmlns:r="http://schemas.openxmlformats.org/officeDocument/2006/relationships" xmlns:p="http://schemas.openxmlformats.org/presentationml/2006/main" type="objTx" preserve="1">
+<p:sldLayout xmlns:a="http://schemas.openxmlformats.org/drawingml/2006/main" xmlns:r="http://schemas.openxmlformats.org/officeDocument/2006/relationships" xmlns:mc="http://schemas.openxmlformats.org/markup-compatibility/2006" xmlns:mv="urn:schemas-microsoft-com:mac:vml" xmlns:p="http://schemas.openxmlformats.org/presentationml/2006/main" mc:Ignorable="mv" mc:PreserveAttributes="mv:*" type="objTx" preserve="1">
   <p:cSld name="Content with Caption">
     <p:spTree>
       <p:nvGrpSpPr>
@@ -2257,7 +2275,8 @@
           <a:p>
             <a:fld id="{061D1A9E-CEF3-4B83-AED0-22B57E03EB86}" type="datetimeFigureOut">
               <a:rPr lang="en-US" smtClean="0"/>
-              <a:t>10/17/2012</a:t>
+              <a:pPr/>
+              <a:t>10/17/12</a:t>
             </a:fld>
             <a:endParaRPr lang="en-US"/>
           </a:p>
@@ -2299,6 +2318,7 @@
           <a:p>
             <a:fld id="{871DFA71-C2DA-48F3-BBF9-C56BDFDCA947}" type="slidenum">
               <a:rPr lang="en-US" smtClean="0"/>
+              <a:pPr/>
               <a:t>‹#›</a:t>
             </a:fld>
             <a:endParaRPr lang="en-US"/>
@@ -2308,7 +2328,7 @@
     </p:spTree>
     <p:extLst>
       <p:ext uri="{BB962C8B-B14F-4D97-AF65-F5344CB8AC3E}">
-        <p14:creationId xmlns:p14="http://schemas.microsoft.com/office/powerpoint/2010/main" val="3514920069"/>
+        <p14:creationId xmlns:p14="http://schemas.microsoft.com/office/powerpoint/2010/main" xmlns:p="http://schemas.openxmlformats.org/presentationml/2006/main" xmlns:r="http://schemas.openxmlformats.org/officeDocument/2006/relationships" xmlns:a="http://schemas.openxmlformats.org/drawingml/2006/main" xmlns="" val="3514920069"/>
       </p:ext>
     </p:extLst>
   </p:cSld>
@@ -2319,7 +2339,7 @@
 </file>
 
 <file path=ppt/slideLayouts/slideLayout9.xml><?xml version="1.0" encoding="utf-8"?>
-<p:sldLayout xmlns:a="http://schemas.openxmlformats.org/drawingml/2006/main" xmlns:r="http://schemas.openxmlformats.org/officeDocument/2006/relationships" xmlns:p="http://schemas.openxmlformats.org/presentationml/2006/main" type="picTx" preserve="1">
+<p:sldLayout xmlns:a="http://schemas.openxmlformats.org/drawingml/2006/main" xmlns:r="http://schemas.openxmlformats.org/officeDocument/2006/relationships" xmlns:mc="http://schemas.openxmlformats.org/markup-compatibility/2006" xmlns:mv="urn:schemas-microsoft-com:mac:vml" xmlns:p="http://schemas.openxmlformats.org/presentationml/2006/main" mc:Ignorable="mv" mc:PreserveAttributes="mv:*" type="picTx" preserve="1">
   <p:cSld name="Picture with Caption">
     <p:spTree>
       <p:nvGrpSpPr>
@@ -2510,7 +2530,8 @@
           <a:p>
             <a:fld id="{061D1A9E-CEF3-4B83-AED0-22B57E03EB86}" type="datetimeFigureOut">
               <a:rPr lang="en-US" smtClean="0"/>
-              <a:t>10/17/2012</a:t>
+              <a:pPr/>
+              <a:t>10/17/12</a:t>
             </a:fld>
             <a:endParaRPr lang="en-US"/>
           </a:p>
@@ -2552,6 +2573,7 @@
           <a:p>
             <a:fld id="{871DFA71-C2DA-48F3-BBF9-C56BDFDCA947}" type="slidenum">
               <a:rPr lang="en-US" smtClean="0"/>
+              <a:pPr/>
               <a:t>‹#›</a:t>
             </a:fld>
             <a:endParaRPr lang="en-US"/>
@@ -2561,7 +2583,7 @@
     </p:spTree>
     <p:extLst>
       <p:ext uri="{BB962C8B-B14F-4D97-AF65-F5344CB8AC3E}">
-        <p14:creationId xmlns:p14="http://schemas.microsoft.com/office/powerpoint/2010/main" val="3700349325"/>
+        <p14:creationId xmlns:p14="http://schemas.microsoft.com/office/powerpoint/2010/main" xmlns:p="http://schemas.openxmlformats.org/presentationml/2006/main" xmlns:r="http://schemas.openxmlformats.org/officeDocument/2006/relationships" xmlns:a="http://schemas.openxmlformats.org/drawingml/2006/main" xmlns="" val="3700349325"/>
       </p:ext>
     </p:extLst>
   </p:cSld>
@@ -2572,7 +2594,7 @@
 </file>
 
 <file path=ppt/slideMasters/slideMaster1.xml><?xml version="1.0" encoding="utf-8"?>
-<p:sldMaster xmlns:a="http://schemas.openxmlformats.org/drawingml/2006/main" xmlns:r="http://schemas.openxmlformats.org/officeDocument/2006/relationships" xmlns:p="http://schemas.openxmlformats.org/presentationml/2006/main">
+<p:sldMaster xmlns:a="http://schemas.openxmlformats.org/drawingml/2006/main" xmlns:r="http://schemas.openxmlformats.org/officeDocument/2006/relationships" xmlns:mc="http://schemas.openxmlformats.org/markup-compatibility/2006" xmlns:mv="urn:schemas-microsoft-com:mac:vml" xmlns:p="http://schemas.openxmlformats.org/presentationml/2006/main" mc:Ignorable="mv" mc:PreserveAttributes="mv:*">
   <p:cSld>
     <p:bg>
       <p:bgRef idx="1001">
@@ -2723,7 +2745,8 @@
           <a:p>
             <a:fld id="{061D1A9E-CEF3-4B83-AED0-22B57E03EB86}" type="datetimeFigureOut">
               <a:rPr lang="en-US" smtClean="0"/>
-              <a:t>10/17/2012</a:t>
+              <a:pPr/>
+              <a:t>10/17/12</a:t>
             </a:fld>
             <a:endParaRPr lang="en-US"/>
           </a:p>
@@ -2801,6 +2824,7 @@
           <a:p>
             <a:fld id="{871DFA71-C2DA-48F3-BBF9-C56BDFDCA947}" type="slidenum">
               <a:rPr lang="en-US" smtClean="0"/>
+              <a:pPr/>
               <a:t>‹#›</a:t>
             </a:fld>
             <a:endParaRPr lang="en-US"/>
@@ -2810,7 +2834,7 @@
     </p:spTree>
     <p:extLst>
       <p:ext uri="{BB962C8B-B14F-4D97-AF65-F5344CB8AC3E}">
-        <p14:creationId xmlns:p14="http://schemas.microsoft.com/office/powerpoint/2010/main" val="3237338277"/>
+        <p14:creationId xmlns:p14="http://schemas.microsoft.com/office/powerpoint/2010/main" xmlns:p="http://schemas.openxmlformats.org/presentationml/2006/main" xmlns:r="http://schemas.openxmlformats.org/officeDocument/2006/relationships" xmlns:a="http://schemas.openxmlformats.org/drawingml/2006/main" xmlns="" val="3237338277"/>
       </p:ext>
     </p:extLst>
   </p:cSld>
@@ -3082,7 +3106,7 @@
 </file>
 
 <file path=ppt/slides/slide1.xml><?xml version="1.0" encoding="utf-8"?>
-<p:sld xmlns:a="http://schemas.openxmlformats.org/drawingml/2006/main" xmlns:r="http://schemas.openxmlformats.org/officeDocument/2006/relationships" xmlns:p="http://schemas.openxmlformats.org/presentationml/2006/main">
+<p:sld xmlns:a="http://schemas.openxmlformats.org/drawingml/2006/main" xmlns:r="http://schemas.openxmlformats.org/officeDocument/2006/relationships" xmlns:mc="http://schemas.openxmlformats.org/markup-compatibility/2006" xmlns:mv="urn:schemas-microsoft-com:mac:vml" xmlns:p="http://schemas.openxmlformats.org/presentationml/2006/main" mc:Ignorable="mv" mc:PreserveAttributes="mv:*">
   <p:cSld>
     <p:spTree>
       <p:nvGrpSpPr>
@@ -3107,7 +3131,7 @@
         <p:spPr>
           <a:xfrm>
             <a:off x="-21336" y="242292"/>
-            <a:ext cx="9165336" cy="6463308"/>
+            <a:ext cx="9165336" cy="6740308"/>
           </a:xfrm>
           <a:prstGeom prst="rect">
             <a:avLst/>
@@ -3126,14 +3150,22 @@
             </a:pPr>
             <a:r>
               <a:rPr lang="en-US" dirty="0" smtClean="0"/>
-              <a:t>Lattice Boltzmann – How is different from other simulation technique</a:t>
+              <a:t>Lattice Boltzmann – How is different from other simulation </a:t>
+            </a:r>
+            <a:r>
+              <a:rPr lang="en-US" dirty="0" smtClean="0"/>
+              <a:t>techniques</a:t>
             </a:r>
           </a:p>
           <a:p>
             <a:pPr lvl="2"/>
             <a:r>
               <a:rPr lang="en-US" dirty="0" smtClean="0"/>
-              <a:t>Possible comparison with Gaudy</a:t>
+              <a:t>Possible comparison with </a:t>
+            </a:r>
+            <a:r>
+              <a:rPr lang="en-US" dirty="0" smtClean="0"/>
+              <a:t>Gaudy (difference with CFD simulation)</a:t>
             </a:r>
           </a:p>
           <a:p>
@@ -3150,13 +3182,14 @@
               <a:t>LB strength – 2 phase systems (emulsion) + Flow through </a:t>
             </a:r>
             <a:r>
-              <a:rPr lang="en-US" dirty="0" err="1" smtClean="0"/>
-              <a:t>pourous</a:t>
-            </a:r>
-            <a:r>
-              <a:rPr lang="en-US" dirty="0" smtClean="0"/>
-              <a:t> media</a:t>
-            </a:r>
+              <a:rPr lang="en-US" dirty="0" smtClean="0"/>
+              <a:t>porous media + Cars + </a:t>
+            </a:r>
+            <a:r>
+              <a:rPr lang="en-US" dirty="0" smtClean="0"/>
+              <a:t>Parallel</a:t>
+            </a:r>
+            <a:endParaRPr lang="en-US" dirty="0" smtClean="0"/>
           </a:p>
           <a:p>
             <a:pPr marL="285750" indent="-285750">
@@ -3185,7 +3218,19 @@
             </a:r>
             <a:r>
               <a:rPr lang="en-US" dirty="0" smtClean="0"/>
-              <a:t>Parameters space</a:t>
+              <a:t>Parameters </a:t>
+            </a:r>
+            <a:r>
+              <a:rPr lang="en-US" dirty="0" smtClean="0"/>
+              <a:t>space (surface tension, contact angle, viscosity </a:t>
+            </a:r>
+            <a:r>
+              <a:rPr lang="en-US" dirty="0" smtClean="0"/>
+              <a:t>ratio</a:t>
+            </a:r>
+            <a:r>
+              <a:rPr lang="en-US" dirty="0" smtClean="0"/>
+              <a:t>, pressure)</a:t>
             </a:r>
           </a:p>
           <a:p>
@@ -3195,7 +3240,7 @@
             </a:r>
             <a:r>
               <a:rPr lang="en-US" dirty="0" smtClean="0"/>
-              <a:t>Compiler</a:t>
+              <a:t>Compiler (code + visualization + availability to P&amp;G)</a:t>
             </a:r>
           </a:p>
           <a:p>
@@ -3208,14 +3253,21 @@
               <a:t>VTK output  visualization with </a:t>
             </a:r>
             <a:r>
-              <a:rPr lang="en-US" dirty="0" err="1"/>
-              <a:t>P</a:t>
-            </a:r>
-            <a:r>
               <a:rPr lang="en-US" dirty="0" err="1" smtClean="0"/>
-              <a:t>araview</a:t>
-            </a:r>
-            <a:endParaRPr lang="en-US" dirty="0" smtClean="0"/>
+              <a:t>Paraview</a:t>
+            </a:r>
+            <a:r>
+              <a:rPr lang="en-US" dirty="0" smtClean="0"/>
+              <a:t> (</a:t>
+            </a:r>
+            <a:r>
+              <a:rPr lang="en-US" dirty="0" err="1" smtClean="0"/>
+              <a:t>OpenSource</a:t>
+            </a:r>
+            <a:r>
+              <a:rPr lang="en-US" dirty="0" smtClean="0"/>
+              <a:t>) </a:t>
+            </a:r>
           </a:p>
           <a:p>
             <a:r>
@@ -3224,7 +3276,19 @@
             </a:r>
             <a:r>
               <a:rPr lang="en-US" dirty="0" smtClean="0"/>
-              <a:t>Lots of opportunity to make this more user friendly</a:t>
+              <a:t>Lots of opportunity to make this more user </a:t>
+            </a:r>
+            <a:r>
+              <a:rPr lang="en-US" dirty="0" smtClean="0"/>
+              <a:t>friendly (Qt, </a:t>
+            </a:r>
+            <a:r>
+              <a:rPr lang="en-US" dirty="0" smtClean="0"/>
+              <a:t>Python</a:t>
+            </a:r>
+            <a:r>
+              <a:rPr lang="en-US" dirty="0" smtClean="0"/>
+              <a:t>)</a:t>
             </a:r>
           </a:p>
           <a:p>
@@ -3267,7 +3331,25 @@
             </a:r>
             <a:r>
               <a:rPr lang="en-US" dirty="0" smtClean="0"/>
-              <a:t>Effect of radius, interfacial tension, viscosity ratio, Flow conditions</a:t>
+              <a:t>Effect of radius, interfacial tension, viscosity </a:t>
+            </a:r>
+            <a:r>
+              <a:rPr lang="en-US" dirty="0" smtClean="0"/>
+              <a:t>ratio (movies) </a:t>
+            </a:r>
+          </a:p>
+          <a:p>
+            <a:r>
+              <a:rPr lang="en-US" dirty="0" smtClean="0"/>
+              <a:t>	Flow conditions (Laplace </a:t>
+            </a:r>
+            <a:r>
+              <a:rPr lang="en-US" dirty="0" smtClean="0"/>
+              <a:t>law, </a:t>
+            </a:r>
+            <a:r>
+              <a:rPr lang="en-US" dirty="0" smtClean="0"/>
+              <a:t>more focus on hydro)</a:t>
             </a:r>
           </a:p>
           <a:p>
@@ -3291,7 +3373,11 @@
             </a:r>
             <a:r>
               <a:rPr lang="en-US" dirty="0" smtClean="0"/>
-              <a:t>Continuing mapping space</a:t>
+              <a:t>Continuing mapping </a:t>
+            </a:r>
+            <a:r>
+              <a:rPr lang="en-US" dirty="0" smtClean="0"/>
+              <a:t>space (give me non-dimensional parameters)</a:t>
             </a:r>
           </a:p>
           <a:p>
@@ -3302,7 +3388,19 @@
             </a:r>
             <a:r>
               <a:rPr lang="en-US" dirty="0" smtClean="0"/>
-              <a:t>Extend investigation to more complex mesh</a:t>
+              <a:t>Extend investigation to more complex </a:t>
+            </a:r>
+            <a:r>
+              <a:rPr lang="en-US" dirty="0" smtClean="0"/>
+              <a:t>mesh (</a:t>
+            </a:r>
+            <a:r>
+              <a:rPr lang="en-US" dirty="0" smtClean="0"/>
+              <a:t>array of cylinders</a:t>
+            </a:r>
+            <a:r>
+              <a:rPr lang="en-US" dirty="0" smtClean="0"/>
+              <a:t>)</a:t>
             </a:r>
           </a:p>
           <a:p>
@@ -3313,7 +3411,11 @@
             </a:r>
             <a:r>
               <a:rPr lang="en-US" dirty="0" smtClean="0"/>
-              <a:t>Extend investigation to different shape for endoskeleton droplets</a:t>
+              <a:t>Extend investigation to different shape for endoskeleton </a:t>
+            </a:r>
+            <a:r>
+              <a:rPr lang="en-US" dirty="0" smtClean="0"/>
+              <a:t>droplets (best shape)</a:t>
             </a:r>
           </a:p>
           <a:p>
@@ -3334,19 +3436,24 @@
             <a:pPr lvl="2"/>
             <a:r>
               <a:rPr lang="en-US" dirty="0" smtClean="0"/>
-              <a:t>Interaction between simulator and real word</a:t>
-            </a:r>
-            <a:r>
-              <a:rPr lang="en-US" dirty="0"/>
-              <a:t>	</a:t>
-            </a:r>
+              <a:t>Interaction between simulator and real </a:t>
+            </a:r>
+            <a:r>
+              <a:rPr lang="en-US" dirty="0" smtClean="0"/>
+              <a:t>word</a:t>
+            </a:r>
+            <a:r>
+              <a:rPr lang="en-US" dirty="0" smtClean="0"/>
+              <a:t> (get excitement, send me the link)</a:t>
+            </a:r>
+            <a:endParaRPr lang="en-US" dirty="0"/>
           </a:p>
         </p:txBody>
       </p:sp>
     </p:spTree>
     <p:extLst>
       <p:ext uri="{BB962C8B-B14F-4D97-AF65-F5344CB8AC3E}">
-        <p14:creationId xmlns:p14="http://schemas.microsoft.com/office/powerpoint/2010/main" val="3402760012"/>
+        <p14:creationId xmlns:p14="http://schemas.microsoft.com/office/powerpoint/2010/main" xmlns:p="http://schemas.openxmlformats.org/presentationml/2006/main" xmlns:r="http://schemas.openxmlformats.org/officeDocument/2006/relationships" xmlns:a="http://schemas.openxmlformats.org/drawingml/2006/main" xmlns="" val="3402760012"/>
       </p:ext>
     </p:extLst>
   </p:cSld>
@@ -3357,7 +3464,7 @@
 </file>
 
 <file path=ppt/tags/tag1.xml><?xml version="1.0" encoding="utf-8"?>
-<p:tagLst xmlns:a="http://schemas.openxmlformats.org/drawingml/2006/main" xmlns:r="http://schemas.openxmlformats.org/officeDocument/2006/relationships" xmlns:p="http://schemas.openxmlformats.org/presentationml/2006/main">
+<p:tagLst xmlns:a="http://schemas.openxmlformats.org/drawingml/2006/main" xmlns:r="http://schemas.openxmlformats.org/officeDocument/2006/relationships" xmlns:mc="http://schemas.openxmlformats.org/markup-compatibility/2006" xmlns:mv="urn:schemas-microsoft-com:mac:vml" xmlns:p="http://schemas.openxmlformats.org/presentationml/2006/main" mc:Ignorable="mv" mc:PreserveAttributes="mv:*">
   <p:tag name="ISPRING_RESOURCE_PATHS_HASH_2" val="28b8a59098125ef0d2dbb68c1b15330e999625c"/>
   <p:tag name="ISPRING_RESOURCE_PATHS_HASH" val="a481d4bd8fdcad33681b94c2150fec594f4c7e"/>
 </p:tagLst>

</xml_diff>